<commit_message>
chore(メイン.pptx) add review last class
</commit_message>
<xml_diff>
--- a/section1(導入と一次分数変換)/群の気持ち.pptx
+++ b/section1(導入と一次分数変換)/群の気持ち.pptx
@@ -5,7 +5,7 @@
     <p:sldMasterId id="2147483648" r:id="rId1"/>
   </p:sldMasterIdLst>
   <p:notesMasterIdLst>
-    <p:notesMasterId r:id="rId31"/>
+    <p:notesMasterId r:id="rId32"/>
   </p:notesMasterIdLst>
   <p:sldIdLst>
     <p:sldId id="256" r:id="rId2"/>
@@ -28,15 +28,16 @@
     <p:sldId id="302" r:id="rId19"/>
     <p:sldId id="303" r:id="rId20"/>
     <p:sldId id="304" r:id="rId21"/>
-    <p:sldId id="351" r:id="rId22"/>
-    <p:sldId id="356" r:id="rId23"/>
-    <p:sldId id="357" r:id="rId24"/>
-    <p:sldId id="358" r:id="rId25"/>
-    <p:sldId id="359" r:id="rId26"/>
-    <p:sldId id="345" r:id="rId27"/>
-    <p:sldId id="360" r:id="rId28"/>
-    <p:sldId id="344" r:id="rId29"/>
-    <p:sldId id="361" r:id="rId30"/>
+    <p:sldId id="362" r:id="rId22"/>
+    <p:sldId id="351" r:id="rId23"/>
+    <p:sldId id="356" r:id="rId24"/>
+    <p:sldId id="357" r:id="rId25"/>
+    <p:sldId id="358" r:id="rId26"/>
+    <p:sldId id="359" r:id="rId27"/>
+    <p:sldId id="345" r:id="rId28"/>
+    <p:sldId id="360" r:id="rId29"/>
+    <p:sldId id="344" r:id="rId30"/>
+    <p:sldId id="361" r:id="rId31"/>
   </p:sldIdLst>
   <p:sldSz cx="12192000" cy="6858000"/>
   <p:notesSz cx="6858000" cy="9144000"/>
@@ -732,6 +733,115 @@
     </p:spTree>
     <p:extLst>
       <p:ext uri="{BB962C8B-B14F-4D97-AF65-F5344CB8AC3E}">
+        <p14:creationId xmlns:p14="http://schemas.microsoft.com/office/powerpoint/2010/main" val="1049163036"/>
+      </p:ext>
+    </p:extLst>
+  </p:cSld>
+  <p:clrMapOvr>
+    <a:masterClrMapping/>
+  </p:clrMapOvr>
+</p:notes>
+</file>
+
+<file path=ppt/notesSlides/notesSlide11.xml><?xml version="1.0" encoding="utf-8"?>
+<p:notes xmlns:a="http://schemas.openxmlformats.org/drawingml/2006/main" xmlns:r="http://schemas.openxmlformats.org/officeDocument/2006/relationships" xmlns:p="http://schemas.openxmlformats.org/presentationml/2006/main" showMasterSp="0" showMasterPhAnim="0">
+  <p:cSld>
+    <p:spTree>
+      <p:nvGrpSpPr>
+        <p:cNvPr id="1" name="Shape 420"/>
+        <p:cNvGrpSpPr/>
+        <p:nvPr/>
+      </p:nvGrpSpPr>
+      <p:grpSpPr>
+        <a:xfrm>
+          <a:off x="0" y="0"/>
+          <a:ext cx="0" cy="0"/>
+          <a:chOff x="0" y="0"/>
+          <a:chExt cx="0" cy="0"/>
+        </a:xfrm>
+      </p:grpSpPr>
+      <p:sp>
+        <p:nvSpPr>
+          <p:cNvPr id="421" name="Google Shape;421;g5f98c830ba_1_0:notes"/>
+          <p:cNvSpPr>
+            <a:spLocks noGrp="1" noRot="1" noChangeAspect="1"/>
+          </p:cNvSpPr>
+          <p:nvPr>
+            <p:ph type="sldImg" idx="2"/>
+          </p:nvPr>
+        </p:nvSpPr>
+        <p:spPr>
+          <a:xfrm>
+            <a:off x="381000" y="685800"/>
+            <a:ext cx="6096000" cy="3429000"/>
+          </a:xfrm>
+          <a:custGeom>
+            <a:avLst/>
+            <a:gdLst/>
+            <a:ahLst/>
+            <a:cxnLst/>
+            <a:rect l="l" t="t" r="r" b="b"/>
+            <a:pathLst>
+              <a:path w="120000" h="120000" extrusionOk="0">
+                <a:moveTo>
+                  <a:pt x="0" y="0"/>
+                </a:moveTo>
+                <a:lnTo>
+                  <a:pt x="120000" y="0"/>
+                </a:lnTo>
+                <a:lnTo>
+                  <a:pt x="120000" y="120000"/>
+                </a:lnTo>
+                <a:lnTo>
+                  <a:pt x="0" y="120000"/>
+                </a:lnTo>
+                <a:close/>
+              </a:path>
+            </a:pathLst>
+          </a:custGeom>
+        </p:spPr>
+      </p:sp>
+      <p:sp>
+        <p:nvSpPr>
+          <p:cNvPr id="422" name="Google Shape;422;g5f98c830ba_1_0:notes"/>
+          <p:cNvSpPr txBox="1">
+            <a:spLocks noGrp="1"/>
+          </p:cNvSpPr>
+          <p:nvPr>
+            <p:ph type="body" idx="1"/>
+          </p:nvPr>
+        </p:nvSpPr>
+        <p:spPr>
+          <a:xfrm>
+            <a:off x="685800" y="4343400"/>
+            <a:ext cx="5486400" cy="4114800"/>
+          </a:xfrm>
+          <a:prstGeom prst="rect">
+            <a:avLst/>
+          </a:prstGeom>
+        </p:spPr>
+        <p:txBody>
+          <a:bodyPr spcFirstLastPara="1" wrap="square" lIns="91425" tIns="91425" rIns="91425" bIns="91425" anchor="t" anchorCtr="0">
+            <a:noAutofit/>
+          </a:bodyPr>
+          <a:lstStyle/>
+          <a:p>
+            <a:pPr marL="0" lvl="0" indent="0" algn="l" rtl="0">
+              <a:spcBef>
+                <a:spcPts val="0"/>
+              </a:spcBef>
+              <a:spcAft>
+                <a:spcPts val="0"/>
+              </a:spcAft>
+              <a:buNone/>
+            </a:pPr>
+            <a:endParaRPr/>
+          </a:p>
+        </p:txBody>
+      </p:sp>
+    </p:spTree>
+    <p:extLst>
+      <p:ext uri="{BB962C8B-B14F-4D97-AF65-F5344CB8AC3E}">
         <p14:creationId xmlns:p14="http://schemas.microsoft.com/office/powerpoint/2010/main" val="3319765795"/>
       </p:ext>
     </p:extLst>
@@ -742,7 +852,7 @@
 </p:notes>
 </file>
 
-<file path=ppt/notesSlides/notesSlide11.xml><?xml version="1.0" encoding="utf-8"?>
+<file path=ppt/notesSlides/notesSlide12.xml><?xml version="1.0" encoding="utf-8"?>
 <p:notes xmlns:a="http://schemas.openxmlformats.org/drawingml/2006/main" xmlns:r="http://schemas.openxmlformats.org/officeDocument/2006/relationships" xmlns:p="http://schemas.openxmlformats.org/presentationml/2006/main" showMasterSp="0" showMasterPhAnim="0">
   <p:cSld>
     <p:spTree>
@@ -1267,7 +1377,7 @@
   <p:cSld>
     <p:spTree>
       <p:nvGrpSpPr>
-        <p:cNvPr id="1" name="Shape 420"/>
+        <p:cNvPr id="1" name="Shape 408"/>
         <p:cNvGrpSpPr/>
         <p:nvPr/>
       </p:nvGrpSpPr>
@@ -1281,7 +1391,7 @@
       </p:grpSpPr>
       <p:sp>
         <p:nvSpPr>
-          <p:cNvPr id="421" name="Google Shape;421;g5f98c830ba_1_0:notes"/>
+          <p:cNvPr id="409" name="Google Shape;409;g5f85c4895c_0_26:notes"/>
           <p:cNvSpPr>
             <a:spLocks noGrp="1" noRot="1" noChangeAspect="1"/>
           </p:cNvSpPr>
@@ -1322,7 +1432,7 @@
       </p:sp>
       <p:sp>
         <p:nvSpPr>
-          <p:cNvPr id="422" name="Google Shape;422;g5f98c830ba_1_0:notes"/>
+          <p:cNvPr id="410" name="Google Shape;410;g5f85c4895c_0_26:notes"/>
           <p:cNvSpPr txBox="1">
             <a:spLocks noGrp="1"/>
           </p:cNvSpPr>
@@ -1361,7 +1471,7 @@
     </p:spTree>
     <p:extLst>
       <p:ext uri="{BB962C8B-B14F-4D97-AF65-F5344CB8AC3E}">
-        <p14:creationId xmlns:p14="http://schemas.microsoft.com/office/powerpoint/2010/main" val="1267325842"/>
+        <p14:creationId xmlns:p14="http://schemas.microsoft.com/office/powerpoint/2010/main" val="1468484472"/>
       </p:ext>
     </p:extLst>
   </p:cSld>
@@ -1470,7 +1580,7 @@
     </p:spTree>
     <p:extLst>
       <p:ext uri="{BB962C8B-B14F-4D97-AF65-F5344CB8AC3E}">
-        <p14:creationId xmlns:p14="http://schemas.microsoft.com/office/powerpoint/2010/main" val="3147745320"/>
+        <p14:creationId xmlns:p14="http://schemas.microsoft.com/office/powerpoint/2010/main" val="1267325842"/>
       </p:ext>
     </p:extLst>
   </p:cSld>
@@ -1579,7 +1689,7 @@
     </p:spTree>
     <p:extLst>
       <p:ext uri="{BB962C8B-B14F-4D97-AF65-F5344CB8AC3E}">
-        <p14:creationId xmlns:p14="http://schemas.microsoft.com/office/powerpoint/2010/main" val="4138299237"/>
+        <p14:creationId xmlns:p14="http://schemas.microsoft.com/office/powerpoint/2010/main" val="3147745320"/>
       </p:ext>
     </p:extLst>
   </p:cSld>
@@ -1688,7 +1798,7 @@
     </p:spTree>
     <p:extLst>
       <p:ext uri="{BB962C8B-B14F-4D97-AF65-F5344CB8AC3E}">
-        <p14:creationId xmlns:p14="http://schemas.microsoft.com/office/powerpoint/2010/main" val="1049163036"/>
+        <p14:creationId xmlns:p14="http://schemas.microsoft.com/office/powerpoint/2010/main" val="4138299237"/>
       </p:ext>
     </p:extLst>
   </p:cSld>
@@ -11539,6 +11649,309 @@
   <p:cSld>
     <p:spTree>
       <p:nvGrpSpPr>
+        <p:cNvPr id="1" name="Shape 411"/>
+        <p:cNvGrpSpPr/>
+        <p:nvPr/>
+      </p:nvGrpSpPr>
+      <p:grpSpPr>
+        <a:xfrm>
+          <a:off x="0" y="0"/>
+          <a:ext cx="0" cy="0"/>
+          <a:chOff x="0" y="0"/>
+          <a:chExt cx="0" cy="0"/>
+        </a:xfrm>
+      </p:grpSpPr>
+      <p:sp>
+        <p:nvSpPr>
+          <p:cNvPr id="412" name="Google Shape;412;p72"/>
+          <p:cNvSpPr txBox="1">
+            <a:spLocks noGrp="1"/>
+          </p:cNvSpPr>
+          <p:nvPr>
+            <p:ph type="body" idx="1"/>
+          </p:nvPr>
+        </p:nvSpPr>
+        <p:spPr>
+          <a:xfrm>
+            <a:off x="838200" y="1078692"/>
+            <a:ext cx="10515600" cy="4351200"/>
+          </a:xfrm>
+          <a:prstGeom prst="rect">
+            <a:avLst/>
+          </a:prstGeom>
+        </p:spPr>
+        <p:txBody>
+          <a:bodyPr spcFirstLastPara="1" vert="horz" wrap="square" lIns="91433" tIns="45700" rIns="91433" bIns="45700" rtlCol="0" anchor="t" anchorCtr="0">
+            <a:noAutofit/>
+          </a:bodyPr>
+          <a:lstStyle/>
+          <a:p>
+            <a:pPr marL="0" indent="0">
+              <a:spcBef>
+                <a:spcPts val="1067"/>
+              </a:spcBef>
+              <a:buNone/>
+            </a:pPr>
+            <a:r>
+              <a:rPr lang="fr-CA" altLang="ja" dirty="0" err="1"/>
+              <a:t>lem</a:t>
+            </a:r>
+            <a:endParaRPr dirty="0"/>
+          </a:p>
+          <a:p>
+            <a:pPr marL="0" indent="0">
+              <a:spcBef>
+                <a:spcPts val="1067"/>
+              </a:spcBef>
+              <a:buNone/>
+            </a:pPr>
+            <a:r>
+              <a:rPr lang="ja" dirty="0"/>
+              <a:t>P,Q: 平面状の点，(A,v)</a:t>
+            </a:r>
+            <a:r>
+              <a:rPr lang="ja" dirty="0">
+                <a:highlight>
+                  <a:srgbClr val="FFFFFF"/>
+                </a:highlight>
+              </a:rPr>
+              <a:t>∈E(2)</a:t>
+            </a:r>
+            <a:endParaRPr dirty="0">
+              <a:highlight>
+                <a:srgbClr val="FFFFFF"/>
+              </a:highlight>
+            </a:endParaRPr>
+          </a:p>
+          <a:p>
+            <a:pPr marL="0" indent="0">
+              <a:spcBef>
+                <a:spcPts val="1067"/>
+              </a:spcBef>
+              <a:buNone/>
+            </a:pPr>
+            <a:r>
+              <a:rPr lang="ja" dirty="0">
+                <a:highlight>
+                  <a:srgbClr val="FFFFFF"/>
+                </a:highlight>
+              </a:rPr>
+              <a:t>(PとQのユークリッド距離)=((A,v)•Pと(A,v)•Qの距離に等しい)</a:t>
+            </a:r>
+            <a:endParaRPr dirty="0">
+              <a:highlight>
+                <a:srgbClr val="FFFFFF"/>
+              </a:highlight>
+            </a:endParaRPr>
+          </a:p>
+          <a:p>
+            <a:pPr marL="609585" indent="0">
+              <a:spcBef>
+                <a:spcPts val="1067"/>
+              </a:spcBef>
+              <a:buNone/>
+            </a:pPr>
+            <a:r>
+              <a:rPr lang="ja" dirty="0">
+                <a:highlight>
+                  <a:srgbClr val="FFFFFF"/>
+                </a:highlight>
+              </a:rPr>
+              <a:t>ユークリッド距離</a:t>
+            </a:r>
+            <a:endParaRPr dirty="0">
+              <a:highlight>
+                <a:srgbClr val="FFFFFF"/>
+              </a:highlight>
+            </a:endParaRPr>
+          </a:p>
+          <a:p>
+            <a:pPr marL="609585" indent="0">
+              <a:spcBef>
+                <a:spcPts val="1067"/>
+              </a:spcBef>
+              <a:buNone/>
+            </a:pPr>
+            <a:r>
+              <a:rPr lang="ja" dirty="0">
+                <a:highlight>
+                  <a:srgbClr val="FFFFFF"/>
+                </a:highlight>
+              </a:rPr>
+              <a:t>いわゆる一般的に求める距離．</a:t>
+            </a:r>
+            <a:endParaRPr dirty="0">
+              <a:highlight>
+                <a:srgbClr val="FFFFFF"/>
+              </a:highlight>
+            </a:endParaRPr>
+          </a:p>
+          <a:p>
+            <a:pPr marL="609585" indent="0">
+              <a:spcBef>
+                <a:spcPts val="1067"/>
+              </a:spcBef>
+              <a:buNone/>
+            </a:pPr>
+            <a:r>
+              <a:rPr lang="ja" dirty="0">
+                <a:highlight>
+                  <a:srgbClr val="FFFFFF"/>
+                </a:highlight>
+              </a:rPr>
+              <a:t>点(x1,y1)と点(x2,y2)のときの</a:t>
+            </a:r>
+            <a:endParaRPr dirty="0">
+              <a:highlight>
+                <a:srgbClr val="FFFFFF"/>
+              </a:highlight>
+            </a:endParaRPr>
+          </a:p>
+          <a:p>
+            <a:pPr marL="609585" indent="0">
+              <a:spcBef>
+                <a:spcPts val="1067"/>
+              </a:spcBef>
+              <a:buNone/>
+            </a:pPr>
+            <a:r>
+              <a:rPr lang="ja" dirty="0">
+                <a:highlight>
+                  <a:srgbClr val="FFFFFF"/>
+                </a:highlight>
+              </a:rPr>
+              <a:t>ユークリッド距離は√{(x2-x1)^2+(y2-y1)^2}</a:t>
+            </a:r>
+            <a:endParaRPr dirty="0">
+              <a:highlight>
+                <a:srgbClr val="FFFFFF"/>
+              </a:highlight>
+            </a:endParaRPr>
+          </a:p>
+          <a:p>
+            <a:pPr marL="609585" indent="0">
+              <a:spcBef>
+                <a:spcPts val="1067"/>
+              </a:spcBef>
+              <a:buNone/>
+            </a:pPr>
+            <a:endParaRPr dirty="0">
+              <a:highlight>
+                <a:srgbClr val="FFFFFF"/>
+              </a:highlight>
+            </a:endParaRPr>
+          </a:p>
+          <a:p>
+            <a:pPr marL="0" indent="0">
+              <a:spcBef>
+                <a:spcPts val="1067"/>
+              </a:spcBef>
+              <a:buNone/>
+            </a:pPr>
+            <a:r>
+              <a:rPr lang="ja" dirty="0">
+                <a:highlight>
+                  <a:srgbClr val="FFFFFF"/>
+                </a:highlight>
+              </a:rPr>
+              <a:t>つまり，変換してもユークリッド距離が保たれる変換</a:t>
+            </a:r>
+            <a:r>
+              <a:rPr lang="ja" altLang="en-US" dirty="0">
+                <a:highlight>
+                  <a:srgbClr val="FFFFFF"/>
+                </a:highlight>
+              </a:rPr>
+              <a:t>（</a:t>
+            </a:r>
+            <a:r>
+              <a:rPr lang="ja-JP" altLang="en-US">
+                <a:highlight>
+                  <a:srgbClr val="FFFFFF"/>
+                </a:highlight>
+              </a:rPr>
+              <a:t>等長変換</a:t>
+            </a:r>
+            <a:r>
+              <a:rPr lang="ja" altLang="en-US" dirty="0">
+                <a:highlight>
+                  <a:srgbClr val="FFFFFF"/>
+                </a:highlight>
+              </a:rPr>
+              <a:t>）</a:t>
+            </a:r>
+            <a:r>
+              <a:rPr lang="ja" dirty="0">
+                <a:highlight>
+                  <a:srgbClr val="FFFFFF"/>
+                </a:highlight>
+              </a:rPr>
+              <a:t>ということ</a:t>
+            </a:r>
+            <a:endParaRPr dirty="0">
+              <a:highlight>
+                <a:srgbClr val="FFFFFF"/>
+              </a:highlight>
+            </a:endParaRPr>
+          </a:p>
+        </p:txBody>
+      </p:sp>
+      <p:sp>
+        <p:nvSpPr>
+          <p:cNvPr id="413" name="Google Shape;413;p72"/>
+          <p:cNvSpPr txBox="1">
+            <a:spLocks noGrp="1"/>
+          </p:cNvSpPr>
+          <p:nvPr>
+            <p:ph type="title"/>
+          </p:nvPr>
+        </p:nvSpPr>
+        <p:spPr>
+          <a:xfrm>
+            <a:off x="838200" y="-8"/>
+            <a:ext cx="10515600" cy="1325600"/>
+          </a:xfrm>
+          <a:prstGeom prst="rect">
+            <a:avLst/>
+          </a:prstGeom>
+        </p:spPr>
+        <p:txBody>
+          <a:bodyPr spcFirstLastPara="1" vert="horz" wrap="square" lIns="91433" tIns="45700" rIns="91433" bIns="45700" rtlCol="0" anchor="ctr" anchorCtr="0">
+            <a:noAutofit/>
+          </a:bodyPr>
+          <a:lstStyle/>
+          <a:p>
+            <a:pPr>
+              <a:spcBef>
+                <a:spcPts val="0"/>
+              </a:spcBef>
+            </a:pPr>
+            <a:r>
+              <a:rPr lang="ja"/>
+              <a:t>合同変換群の由来</a:t>
+            </a:r>
+            <a:endParaRPr/>
+          </a:p>
+        </p:txBody>
+      </p:sp>
+    </p:spTree>
+    <p:extLst>
+      <p:ext uri="{BB962C8B-B14F-4D97-AF65-F5344CB8AC3E}">
+        <p14:creationId xmlns:p14="http://schemas.microsoft.com/office/powerpoint/2010/main" val="3832099977"/>
+      </p:ext>
+    </p:extLst>
+  </p:cSld>
+  <p:clrMapOvr>
+    <a:masterClrMapping/>
+  </p:clrMapOvr>
+</p:sld>
+</file>
+
+<file path=ppt/slides/slide22.xml><?xml version="1.0" encoding="utf-8"?>
+<p:sld xmlns:a="http://schemas.openxmlformats.org/drawingml/2006/main" xmlns:r="http://schemas.openxmlformats.org/officeDocument/2006/relationships" xmlns:p="http://schemas.openxmlformats.org/presentationml/2006/main">
+  <p:cSld>
+    <p:spTree>
+      <p:nvGrpSpPr>
         <p:cNvPr id="1" name="Shape 423"/>
         <p:cNvGrpSpPr/>
         <p:nvPr/>
@@ -11726,7 +12139,7 @@
 </p:sld>
 </file>
 
-<file path=ppt/slides/slide22.xml><?xml version="1.0" encoding="utf-8"?>
+<file path=ppt/slides/slide23.xml><?xml version="1.0" encoding="utf-8"?>
 <p:sld xmlns:a="http://schemas.openxmlformats.org/drawingml/2006/main" xmlns:r="http://schemas.openxmlformats.org/officeDocument/2006/relationships" xmlns:p="http://schemas.openxmlformats.org/presentationml/2006/main">
   <p:cSld>
     <p:spTree>
@@ -12167,7 +12580,7 @@
 </p:sld>
 </file>
 
-<file path=ppt/slides/slide23.xml><?xml version="1.0" encoding="utf-8"?>
+<file path=ppt/slides/slide24.xml><?xml version="1.0" encoding="utf-8"?>
 <p:sld xmlns:a="http://schemas.openxmlformats.org/drawingml/2006/main" xmlns:r="http://schemas.openxmlformats.org/officeDocument/2006/relationships" xmlns:p="http://schemas.openxmlformats.org/presentationml/2006/main">
   <p:cSld>
     <p:spTree>
@@ -12701,7 +13114,7 @@
 </p:sld>
 </file>
 
-<file path=ppt/slides/slide24.xml><?xml version="1.0" encoding="utf-8"?>
+<file path=ppt/slides/slide25.xml><?xml version="1.0" encoding="utf-8"?>
 <p:sld xmlns:a="http://schemas.openxmlformats.org/drawingml/2006/main" xmlns:r="http://schemas.openxmlformats.org/officeDocument/2006/relationships" xmlns:p="http://schemas.openxmlformats.org/presentationml/2006/main">
   <p:cSld>
     <p:spTree>
@@ -13685,7 +14098,7 @@
 </p:sld>
 </file>
 
-<file path=ppt/slides/slide25.xml><?xml version="1.0" encoding="utf-8"?>
+<file path=ppt/slides/slide26.xml><?xml version="1.0" encoding="utf-8"?>
 <p:sld xmlns:a="http://schemas.openxmlformats.org/drawingml/2006/main" xmlns:r="http://schemas.openxmlformats.org/officeDocument/2006/relationships" xmlns:p="http://schemas.openxmlformats.org/presentationml/2006/main">
   <p:cSld>
     <p:spTree>
@@ -15485,7 +15898,7 @@
 </p:sld>
 </file>
 
-<file path=ppt/slides/slide26.xml><?xml version="1.0" encoding="utf-8"?>
+<file path=ppt/slides/slide27.xml><?xml version="1.0" encoding="utf-8"?>
 <p:sld xmlns:a="http://schemas.openxmlformats.org/drawingml/2006/main" xmlns:r="http://schemas.openxmlformats.org/officeDocument/2006/relationships" xmlns:p="http://schemas.openxmlformats.org/presentationml/2006/main">
   <p:cSld>
     <p:spTree>
@@ -16366,7 +16779,7 @@
 </p:sld>
 </file>
 
-<file path=ppt/slides/slide27.xml><?xml version="1.0" encoding="utf-8"?>
+<file path=ppt/slides/slide28.xml><?xml version="1.0" encoding="utf-8"?>
 <p:sld xmlns:a="http://schemas.openxmlformats.org/drawingml/2006/main" xmlns:r="http://schemas.openxmlformats.org/officeDocument/2006/relationships" xmlns:p="http://schemas.openxmlformats.org/presentationml/2006/main">
   <p:cSld>
     <p:spTree>
@@ -18055,7 +18468,7 @@
 </p:sld>
 </file>
 
-<file path=ppt/slides/slide28.xml><?xml version="1.0" encoding="utf-8"?>
+<file path=ppt/slides/slide29.xml><?xml version="1.0" encoding="utf-8"?>
 <p:sld xmlns:a="http://schemas.openxmlformats.org/drawingml/2006/main" xmlns:r="http://schemas.openxmlformats.org/officeDocument/2006/relationships" xmlns:p="http://schemas.openxmlformats.org/presentationml/2006/main">
   <p:cSld>
     <p:spTree>
@@ -18188,7 +18601,159 @@
 </p:sld>
 </file>
 
-<file path=ppt/slides/slide29.xml><?xml version="1.0" encoding="utf-8"?>
+<file path=ppt/slides/slide3.xml><?xml version="1.0" encoding="utf-8"?>
+<p:sld xmlns:a="http://schemas.openxmlformats.org/drawingml/2006/main" xmlns:r="http://schemas.openxmlformats.org/officeDocument/2006/relationships" xmlns:p="http://schemas.openxmlformats.org/presentationml/2006/main">
+  <p:cSld>
+    <p:spTree>
+      <p:nvGrpSpPr>
+        <p:cNvPr id="1" name=""/>
+        <p:cNvGrpSpPr/>
+        <p:nvPr/>
+      </p:nvGrpSpPr>
+      <p:grpSpPr>
+        <a:xfrm>
+          <a:off x="0" y="0"/>
+          <a:ext cx="0" cy="0"/>
+          <a:chOff x="0" y="0"/>
+          <a:chExt cx="0" cy="0"/>
+        </a:xfrm>
+      </p:grpSpPr>
+      <p:sp>
+        <p:nvSpPr>
+          <p:cNvPr id="2" name="タイトル 1">
+            <a:extLst>
+              <a:ext uri="{FF2B5EF4-FFF2-40B4-BE49-F238E27FC236}">
+                <a16:creationId xmlns:a16="http://schemas.microsoft.com/office/drawing/2014/main" id="{674F0E3F-DB91-034F-8CAB-1C1E68383363}"/>
+              </a:ext>
+            </a:extLst>
+          </p:cNvPr>
+          <p:cNvSpPr>
+            <a:spLocks noGrp="1"/>
+          </p:cNvSpPr>
+          <p:nvPr>
+            <p:ph type="title"/>
+          </p:nvPr>
+        </p:nvSpPr>
+        <p:spPr/>
+        <p:txBody>
+          <a:bodyPr/>
+          <a:lstStyle/>
+          <a:p>
+            <a:r>
+              <a:rPr lang="ja-JP" altLang="en-US"/>
+              <a:t>新しい方向</a:t>
+            </a:r>
+            <a:r>
+              <a:rPr kumimoji="1" lang="ja-JP" altLang="en-US"/>
+              <a:t>から</a:t>
+            </a:r>
+            <a:r>
+              <a:rPr lang="ja-JP" altLang="en-US"/>
+              <a:t>考える</a:t>
+            </a:r>
+            <a:endParaRPr kumimoji="1" lang="ja-JP" altLang="en-US"/>
+          </a:p>
+        </p:txBody>
+      </p:sp>
+      <p:sp>
+        <p:nvSpPr>
+          <p:cNvPr id="3" name="コンテンツ プレースホルダー 2">
+            <a:extLst>
+              <a:ext uri="{FF2B5EF4-FFF2-40B4-BE49-F238E27FC236}">
+                <a16:creationId xmlns:a16="http://schemas.microsoft.com/office/drawing/2014/main" id="{F4437B64-F072-9D4D-98A5-1CF929DCBC3B}"/>
+              </a:ext>
+            </a:extLst>
+          </p:cNvPr>
+          <p:cNvSpPr>
+            <a:spLocks noGrp="1"/>
+          </p:cNvSpPr>
+          <p:nvPr>
+            <p:ph idx="1"/>
+          </p:nvPr>
+        </p:nvSpPr>
+        <p:spPr/>
+        <p:txBody>
+          <a:bodyPr>
+            <a:normAutofit/>
+          </a:bodyPr>
+          <a:lstStyle/>
+          <a:p>
+            <a:r>
+              <a:rPr lang="ja-JP" altLang="en-US"/>
+              <a:t>「対象に着目して計算」する方針から「対象に対する計算自体に着目」する方針に転換してみよう．</a:t>
+            </a:r>
+            <a:endParaRPr lang="en-US" altLang="ja-JP" dirty="0"/>
+          </a:p>
+          <a:p>
+            <a:r>
+              <a:rPr kumimoji="1" lang="ja-JP" altLang="en-US"/>
+              <a:t>計算自体の関係を考えるので，対象は数である必要はなくな</a:t>
+            </a:r>
+            <a:r>
+              <a:rPr lang="ja-JP" altLang="en-US"/>
+              <a:t>る．現代数学では基本的に集合を対象とする．</a:t>
+            </a:r>
+            <a:endParaRPr kumimoji="1" lang="en-US" altLang="ja-JP" dirty="0"/>
+          </a:p>
+          <a:p>
+            <a:r>
+              <a:rPr lang="ja-JP" altLang="en-US"/>
+              <a:t>計算自体の関係とはなんぞや？</a:t>
+            </a:r>
+            <a:br>
+              <a:rPr lang="en-US" altLang="ja-JP" dirty="0"/>
+            </a:br>
+            <a:r>
+              <a:rPr lang="en-US" altLang="ja-JP" dirty="0"/>
+              <a:t>	→</a:t>
+            </a:r>
+            <a:r>
+              <a:rPr lang="ja-JP" altLang="en-US"/>
+              <a:t>計算（演算，写像）がどのような構造をしているか．</a:t>
+            </a:r>
+            <a:endParaRPr lang="en-US" altLang="ja-JP" dirty="0"/>
+          </a:p>
+          <a:p>
+            <a:endParaRPr kumimoji="1" lang="en-US" altLang="ja-JP" dirty="0"/>
+          </a:p>
+          <a:p>
+            <a:r>
+              <a:rPr lang="ja-JP" altLang="en-US"/>
+              <a:t>演算の</a:t>
+            </a:r>
+            <a:r>
+              <a:rPr lang="en-US" altLang="ja-JP" dirty="0"/>
+              <a:t>(</a:t>
+            </a:r>
+            <a:r>
+              <a:rPr lang="ja-JP" altLang="en-US"/>
+              <a:t>代数的</a:t>
+            </a:r>
+            <a:r>
+              <a:rPr kumimoji="1" lang="en-US" altLang="ja-JP" dirty="0"/>
+              <a:t>)</a:t>
+            </a:r>
+            <a:r>
+              <a:rPr kumimoji="1" lang="ja-JP" altLang="en-US"/>
+              <a:t>構造を「群（もしくは抽象群）」という．</a:t>
+            </a:r>
+          </a:p>
+        </p:txBody>
+      </p:sp>
+    </p:spTree>
+    <p:extLst>
+      <p:ext uri="{BB962C8B-B14F-4D97-AF65-F5344CB8AC3E}">
+        <p14:creationId xmlns:p14="http://schemas.microsoft.com/office/powerpoint/2010/main" val="304269882"/>
+      </p:ext>
+    </p:extLst>
+  </p:cSld>
+  <p:clrMapOvr>
+    <a:masterClrMapping/>
+  </p:clrMapOvr>
+</p:sld>
+</file>
+
+<file path=ppt/slides/slide30.xml><?xml version="1.0" encoding="utf-8"?>
 <p:sld xmlns:a="http://schemas.openxmlformats.org/drawingml/2006/main" xmlns:r="http://schemas.openxmlformats.org/officeDocument/2006/relationships" xmlns:p="http://schemas.openxmlformats.org/presentationml/2006/main">
   <p:cSld>
     <p:spTree>
@@ -18468,158 +19033,6 @@
     <p:extLst>
       <p:ext uri="{BB962C8B-B14F-4D97-AF65-F5344CB8AC3E}">
         <p14:creationId xmlns:p14="http://schemas.microsoft.com/office/powerpoint/2010/main" val="2337004351"/>
-      </p:ext>
-    </p:extLst>
-  </p:cSld>
-  <p:clrMapOvr>
-    <a:masterClrMapping/>
-  </p:clrMapOvr>
-</p:sld>
-</file>
-
-<file path=ppt/slides/slide3.xml><?xml version="1.0" encoding="utf-8"?>
-<p:sld xmlns:a="http://schemas.openxmlformats.org/drawingml/2006/main" xmlns:r="http://schemas.openxmlformats.org/officeDocument/2006/relationships" xmlns:p="http://schemas.openxmlformats.org/presentationml/2006/main">
-  <p:cSld>
-    <p:spTree>
-      <p:nvGrpSpPr>
-        <p:cNvPr id="1" name=""/>
-        <p:cNvGrpSpPr/>
-        <p:nvPr/>
-      </p:nvGrpSpPr>
-      <p:grpSpPr>
-        <a:xfrm>
-          <a:off x="0" y="0"/>
-          <a:ext cx="0" cy="0"/>
-          <a:chOff x="0" y="0"/>
-          <a:chExt cx="0" cy="0"/>
-        </a:xfrm>
-      </p:grpSpPr>
-      <p:sp>
-        <p:nvSpPr>
-          <p:cNvPr id="2" name="タイトル 1">
-            <a:extLst>
-              <a:ext uri="{FF2B5EF4-FFF2-40B4-BE49-F238E27FC236}">
-                <a16:creationId xmlns:a16="http://schemas.microsoft.com/office/drawing/2014/main" id="{674F0E3F-DB91-034F-8CAB-1C1E68383363}"/>
-              </a:ext>
-            </a:extLst>
-          </p:cNvPr>
-          <p:cNvSpPr>
-            <a:spLocks noGrp="1"/>
-          </p:cNvSpPr>
-          <p:nvPr>
-            <p:ph type="title"/>
-          </p:nvPr>
-        </p:nvSpPr>
-        <p:spPr/>
-        <p:txBody>
-          <a:bodyPr/>
-          <a:lstStyle/>
-          <a:p>
-            <a:r>
-              <a:rPr lang="ja-JP" altLang="en-US"/>
-              <a:t>新しい方向</a:t>
-            </a:r>
-            <a:r>
-              <a:rPr kumimoji="1" lang="ja-JP" altLang="en-US"/>
-              <a:t>から</a:t>
-            </a:r>
-            <a:r>
-              <a:rPr lang="ja-JP" altLang="en-US"/>
-              <a:t>考える</a:t>
-            </a:r>
-            <a:endParaRPr kumimoji="1" lang="ja-JP" altLang="en-US"/>
-          </a:p>
-        </p:txBody>
-      </p:sp>
-      <p:sp>
-        <p:nvSpPr>
-          <p:cNvPr id="3" name="コンテンツ プレースホルダー 2">
-            <a:extLst>
-              <a:ext uri="{FF2B5EF4-FFF2-40B4-BE49-F238E27FC236}">
-                <a16:creationId xmlns:a16="http://schemas.microsoft.com/office/drawing/2014/main" id="{F4437B64-F072-9D4D-98A5-1CF929DCBC3B}"/>
-              </a:ext>
-            </a:extLst>
-          </p:cNvPr>
-          <p:cNvSpPr>
-            <a:spLocks noGrp="1"/>
-          </p:cNvSpPr>
-          <p:nvPr>
-            <p:ph idx="1"/>
-          </p:nvPr>
-        </p:nvSpPr>
-        <p:spPr/>
-        <p:txBody>
-          <a:bodyPr>
-            <a:normAutofit/>
-          </a:bodyPr>
-          <a:lstStyle/>
-          <a:p>
-            <a:r>
-              <a:rPr lang="ja-JP" altLang="en-US"/>
-              <a:t>「対象に着目して計算」する方針から「対象に対する計算自体に着目」する方針に転換してみよう．</a:t>
-            </a:r>
-            <a:endParaRPr lang="en-US" altLang="ja-JP" dirty="0"/>
-          </a:p>
-          <a:p>
-            <a:r>
-              <a:rPr kumimoji="1" lang="ja-JP" altLang="en-US"/>
-              <a:t>計算自体の関係を考えるので，対象は数である必要はなくな</a:t>
-            </a:r>
-            <a:r>
-              <a:rPr lang="ja-JP" altLang="en-US"/>
-              <a:t>る．現代数学では基本的に集合を対象とする．</a:t>
-            </a:r>
-            <a:endParaRPr kumimoji="1" lang="en-US" altLang="ja-JP" dirty="0"/>
-          </a:p>
-          <a:p>
-            <a:r>
-              <a:rPr lang="ja-JP" altLang="en-US"/>
-              <a:t>計算自体の関係とはなんぞや？</a:t>
-            </a:r>
-            <a:br>
-              <a:rPr lang="en-US" altLang="ja-JP" dirty="0"/>
-            </a:br>
-            <a:r>
-              <a:rPr lang="en-US" altLang="ja-JP" dirty="0"/>
-              <a:t>	→</a:t>
-            </a:r>
-            <a:r>
-              <a:rPr lang="ja-JP" altLang="en-US"/>
-              <a:t>計算（演算，写像）がどのような構造をしているか．</a:t>
-            </a:r>
-            <a:endParaRPr lang="en-US" altLang="ja-JP" dirty="0"/>
-          </a:p>
-          <a:p>
-            <a:endParaRPr kumimoji="1" lang="en-US" altLang="ja-JP" dirty="0"/>
-          </a:p>
-          <a:p>
-            <a:r>
-              <a:rPr lang="ja-JP" altLang="en-US"/>
-              <a:t>演算の</a:t>
-            </a:r>
-            <a:r>
-              <a:rPr lang="en-US" altLang="ja-JP" dirty="0"/>
-              <a:t>(</a:t>
-            </a:r>
-            <a:r>
-              <a:rPr lang="ja-JP" altLang="en-US"/>
-              <a:t>代数的</a:t>
-            </a:r>
-            <a:r>
-              <a:rPr kumimoji="1" lang="en-US" altLang="ja-JP" dirty="0"/>
-              <a:t>)</a:t>
-            </a:r>
-            <a:r>
-              <a:rPr kumimoji="1" lang="ja-JP" altLang="en-US"/>
-              <a:t>構造を「群（もしくは抽象群）」という．</a:t>
-            </a:r>
-          </a:p>
-        </p:txBody>
-      </p:sp>
-    </p:spTree>
-    <p:extLst>
-      <p:ext uri="{BB962C8B-B14F-4D97-AF65-F5344CB8AC3E}">
-        <p14:creationId xmlns:p14="http://schemas.microsoft.com/office/powerpoint/2010/main" val="304269882"/>
       </p:ext>
     </p:extLst>
   </p:cSld>

</xml_diff>